<commit_message>
updated slide deck template
</commit_message>
<xml_diff>
--- a/Lectures/Slides/SE-Deck-Template.pptx
+++ b/Lectures/Slides/SE-Deck-Template.pptx
@@ -5,7 +5,7 @@
     <p:sldMasterId id="2147483648" r:id="rId1"/>
   </p:sldMasterIdLst>
   <p:notesMasterIdLst>
-    <p:notesMasterId r:id="rId17"/>
+    <p:notesMasterId r:id="rId18"/>
   </p:notesMasterIdLst>
   <p:sldIdLst>
     <p:sldId id="256" r:id="rId2"/>
@@ -22,7 +22,8 @@
     <p:sldId id="267" r:id="rId13"/>
     <p:sldId id="268" r:id="rId14"/>
     <p:sldId id="269" r:id="rId15"/>
-    <p:sldId id="270" r:id="rId16"/>
+    <p:sldId id="271" r:id="rId16"/>
+    <p:sldId id="270" r:id="rId17"/>
   </p:sldIdLst>
   <p:sldSz cx="12192000" cy="6858000"/>
   <p:notesSz cx="6858000" cy="9144000"/>
@@ -2362,6 +2363,133 @@
 </file>
 
 <file path=ppt/notesSlides/notesSlide15.xml><?xml version="1.0" encoding="utf-8"?>
+<p:notes xmlns:a="http://schemas.openxmlformats.org/drawingml/2006/main" xmlns:r="http://schemas.openxmlformats.org/officeDocument/2006/relationships" xmlns:p="http://schemas.openxmlformats.org/presentationml/2006/main" showMasterSp="0" showMasterPhAnim="0">
+  <p:cSld>
+    <p:spTree>
+      <p:nvGrpSpPr>
+        <p:cNvPr id="1" name="Shape 260">
+          <a:extLst>
+            <a:ext uri="{FF2B5EF4-FFF2-40B4-BE49-F238E27FC236}">
+              <a16:creationId xmlns:a16="http://schemas.microsoft.com/office/drawing/2014/main" id="{ED6D95D0-49C4-BE65-6DB0-A8408AD9A1A2}"/>
+            </a:ext>
+          </a:extLst>
+        </p:cNvPr>
+        <p:cNvGrpSpPr/>
+        <p:nvPr/>
+      </p:nvGrpSpPr>
+      <p:grpSpPr>
+        <a:xfrm>
+          <a:off x="0" y="0"/>
+          <a:ext cx="0" cy="0"/>
+          <a:chOff x="0" y="0"/>
+          <a:chExt cx="0" cy="0"/>
+        </a:xfrm>
+      </p:grpSpPr>
+      <p:sp>
+        <p:nvSpPr>
+          <p:cNvPr id="261" name="Google Shape;261;p37:notes">
+            <a:extLst>
+              <a:ext uri="{FF2B5EF4-FFF2-40B4-BE49-F238E27FC236}">
+                <a16:creationId xmlns:a16="http://schemas.microsoft.com/office/drawing/2014/main" id="{D5BF9D20-A937-E031-5ACD-4B566F245A56}"/>
+              </a:ext>
+            </a:extLst>
+          </p:cNvPr>
+          <p:cNvSpPr txBox="1">
+            <a:spLocks noGrp="1"/>
+          </p:cNvSpPr>
+          <p:nvPr>
+            <p:ph type="body" idx="1"/>
+          </p:nvPr>
+        </p:nvSpPr>
+        <p:spPr>
+          <a:xfrm>
+            <a:off x="685800" y="4400550"/>
+            <a:ext cx="5486400" cy="3600450"/>
+          </a:xfrm>
+          <a:prstGeom prst="rect">
+            <a:avLst/>
+          </a:prstGeom>
+        </p:spPr>
+        <p:txBody>
+          <a:bodyPr spcFirstLastPara="1" wrap="square" lIns="91425" tIns="45700" rIns="91425" bIns="45700" anchor="t" anchorCtr="0">
+            <a:noAutofit/>
+          </a:bodyPr>
+          <a:lstStyle/>
+          <a:p>
+            <a:pPr marL="0" lvl="0" indent="0" algn="l" rtl="0">
+              <a:spcBef>
+                <a:spcPts val="0"/>
+              </a:spcBef>
+              <a:spcAft>
+                <a:spcPts val="0"/>
+              </a:spcAft>
+              <a:buNone/>
+            </a:pPr>
+            <a:endParaRPr/>
+          </a:p>
+        </p:txBody>
+      </p:sp>
+      <p:sp>
+        <p:nvSpPr>
+          <p:cNvPr id="262" name="Google Shape;262;p37:notes">
+            <a:extLst>
+              <a:ext uri="{FF2B5EF4-FFF2-40B4-BE49-F238E27FC236}">
+                <a16:creationId xmlns:a16="http://schemas.microsoft.com/office/drawing/2014/main" id="{1666A96F-D523-1F0C-00D5-14D5F35E2C2F}"/>
+              </a:ext>
+            </a:extLst>
+          </p:cNvPr>
+          <p:cNvSpPr>
+            <a:spLocks noGrp="1" noRot="1" noChangeAspect="1"/>
+          </p:cNvSpPr>
+          <p:nvPr>
+            <p:ph type="sldImg" idx="2"/>
+          </p:nvPr>
+        </p:nvSpPr>
+        <p:spPr>
+          <a:xfrm>
+            <a:off x="685800" y="1143000"/>
+            <a:ext cx="5486400" cy="3086100"/>
+          </a:xfrm>
+          <a:custGeom>
+            <a:avLst/>
+            <a:gdLst/>
+            <a:ahLst/>
+            <a:cxnLst/>
+            <a:rect l="l" t="t" r="r" b="b"/>
+            <a:pathLst>
+              <a:path w="120000" h="120000" extrusionOk="0">
+                <a:moveTo>
+                  <a:pt x="0" y="0"/>
+                </a:moveTo>
+                <a:lnTo>
+                  <a:pt x="120000" y="0"/>
+                </a:lnTo>
+                <a:lnTo>
+                  <a:pt x="120000" y="120000"/>
+                </a:lnTo>
+                <a:lnTo>
+                  <a:pt x="0" y="120000"/>
+                </a:lnTo>
+                <a:close/>
+              </a:path>
+            </a:pathLst>
+          </a:custGeom>
+        </p:spPr>
+      </p:sp>
+    </p:spTree>
+    <p:extLst>
+      <p:ext uri="{BB962C8B-B14F-4D97-AF65-F5344CB8AC3E}">
+        <p14:creationId xmlns:p14="http://schemas.microsoft.com/office/powerpoint/2010/main" val="3888823651"/>
+      </p:ext>
+    </p:extLst>
+  </p:cSld>
+  <p:clrMapOvr>
+    <a:masterClrMapping/>
+  </p:clrMapOvr>
+</p:notes>
+</file>
+
+<file path=ppt/notesSlides/notesSlide16.xml><?xml version="1.0" encoding="utf-8"?>
 <p:notes xmlns:a="http://schemas.openxmlformats.org/drawingml/2006/main" xmlns:r="http://schemas.openxmlformats.org/officeDocument/2006/relationships" xmlns:p="http://schemas.openxmlformats.org/presentationml/2006/main" showMasterSp="0" showMasterPhAnim="0">
   <p:cSld>
     <p:spTree>
@@ -15679,7 +15807,7 @@
         <p:spPr>
           <a:xfrm>
             <a:off x="1134035" y="2553964"/>
-            <a:ext cx="9924000" cy="2385228"/>
+            <a:ext cx="9924000" cy="2723782"/>
           </a:xfrm>
           <a:prstGeom prst="rect">
             <a:avLst/>
@@ -15695,44 +15823,21 @@
           </a:bodyPr>
           <a:lstStyle/>
           <a:p>
-            <a:pPr marL="0" marR="0" lvl="0" indent="0" algn="ctr" rtl="0">
-              <a:lnSpc>
-                <a:spcPct val="100000"/>
-              </a:lnSpc>
+            <a:pPr lvl="0" algn="ctr">
               <a:spcBef>
                 <a:spcPts val="600"/>
               </a:spcBef>
-              <a:spcAft>
-                <a:spcPts val="0"/>
-              </a:spcAft>
-              <a:buClr>
-                <a:srgbClr val="000000"/>
-              </a:buClr>
               <a:buSzPts val="4500"/>
-              <a:buFont typeface="Arial"/>
-              <a:buNone/>
             </a:pPr>
             <a:r>
-              <a:rPr lang="en-US" sz="4500" b="1" i="0" u="none" strike="noStrike" cap="none" dirty="0">
+              <a:rPr lang="en-US" sz="4500" b="1" dirty="0">
                 <a:solidFill>
                   <a:schemeClr val="lt1"/>
                 </a:solidFill>
-                <a:latin typeface="Arial"/>
-                <a:ea typeface="Arial"/>
-                <a:cs typeface="Arial"/>
-                <a:sym typeface="Arial"/>
               </a:rPr>
-              <a:t>Title of Presentation</a:t>
+              <a:t>SE 423: Introduction to Mechatronics</a:t>
             </a:r>
-            <a:endParaRPr sz="4500" b="0" i="0" u="none" strike="noStrike" cap="none" dirty="0">
-              <a:solidFill>
-                <a:srgbClr val="000000"/>
-              </a:solidFill>
-              <a:latin typeface="Arial"/>
-              <a:ea typeface="Arial"/>
-              <a:cs typeface="Arial"/>
-              <a:sym typeface="Arial"/>
-            </a:endParaRPr>
+            <a:endParaRPr lang="en-US" sz="4500" dirty="0"/>
           </a:p>
           <a:p>
             <a:pPr marL="0" marR="0" lvl="0" indent="0" algn="ctr" rtl="0">
@@ -15753,7 +15858,7 @@
                   <a:schemeClr val="lt1"/>
                 </a:solidFill>
               </a:rPr>
-              <a:t>SYSTEMS ENGINEERING</a:t>
+              <a:t>Lecture X</a:t>
             </a:r>
             <a:endParaRPr dirty="0"/>
           </a:p>
@@ -15794,7 +15899,7 @@
               <a:buNone/>
             </a:pPr>
             <a:r>
-              <a:rPr lang="en-US" sz="1800" b="0" i="0" u="none" strike="noStrike" cap="none" dirty="0">
+              <a:rPr lang="en-US" sz="1800" b="0" i="0" u="none" strike="noStrike" cap="none">
                 <a:solidFill>
                   <a:schemeClr val="lt1"/>
                 </a:solidFill>
@@ -15803,34 +15908,7 @@
                 <a:cs typeface="Arial"/>
                 <a:sym typeface="Arial"/>
               </a:rPr>
-              <a:t>(For a consistent visual look to the slides please use the font Arial for all the text.)</a:t>
-            </a:r>
-            <a:endParaRPr dirty="0"/>
-          </a:p>
-          <a:p>
-            <a:pPr marL="0" marR="0" lvl="0" indent="0" algn="ctr" rtl="0">
-              <a:lnSpc>
-                <a:spcPct val="100000"/>
-              </a:lnSpc>
-              <a:spcBef>
-                <a:spcPts val="600"/>
-              </a:spcBef>
-              <a:spcAft>
-                <a:spcPts val="0"/>
-              </a:spcAft>
-              <a:buNone/>
-            </a:pPr>
-            <a:r>
-              <a:rPr lang="en-US" sz="1800" b="0" i="0" u="none" strike="noStrike" cap="none" dirty="0">
-                <a:solidFill>
-                  <a:schemeClr val="lt1"/>
-                </a:solidFill>
-                <a:latin typeface="Arial"/>
-                <a:ea typeface="Arial"/>
-                <a:cs typeface="Arial"/>
-                <a:sym typeface="Arial"/>
-              </a:rPr>
-              <a:t>(Additionally, use orange and blue consistently with your headings and subheadings.)</a:t>
+              <a:t>Marius Juston</a:t>
             </a:r>
             <a:endParaRPr sz="1800" b="0" i="0" u="none" strike="noStrike" cap="none" dirty="0">
               <a:solidFill>
@@ -18677,6 +18755,363 @@
 </file>
 
 <file path=ppt/slides/slide15.xml><?xml version="1.0" encoding="utf-8"?>
+<p:sld xmlns:a="http://schemas.openxmlformats.org/drawingml/2006/main" xmlns:r="http://schemas.openxmlformats.org/officeDocument/2006/relationships" xmlns:p="http://schemas.openxmlformats.org/presentationml/2006/main">
+  <p:cSld>
+    <p:bg>
+      <p:bgPr>
+        <a:blipFill>
+          <a:blip r:embed="rId3">
+            <a:alphaModFix/>
+          </a:blip>
+          <a:stretch>
+            <a:fillRect/>
+          </a:stretch>
+        </a:blipFill>
+        <a:effectLst/>
+      </p:bgPr>
+    </p:bg>
+    <p:spTree>
+      <p:nvGrpSpPr>
+        <p:cNvPr id="1" name="Shape 263">
+          <a:extLst>
+            <a:ext uri="{FF2B5EF4-FFF2-40B4-BE49-F238E27FC236}">
+              <a16:creationId xmlns:a16="http://schemas.microsoft.com/office/drawing/2014/main" id="{FA145421-BB40-88A0-CFFD-DC4D9CAC5BB5}"/>
+            </a:ext>
+          </a:extLst>
+        </p:cNvPr>
+        <p:cNvGrpSpPr/>
+        <p:nvPr/>
+      </p:nvGrpSpPr>
+      <p:grpSpPr>
+        <a:xfrm>
+          <a:off x="0" y="0"/>
+          <a:ext cx="0" cy="0"/>
+          <a:chOff x="0" y="0"/>
+          <a:chExt cx="0" cy="0"/>
+        </a:xfrm>
+      </p:grpSpPr>
+      <p:sp>
+        <p:nvSpPr>
+          <p:cNvPr id="264" name="Google Shape;264;p37">
+            <a:extLst>
+              <a:ext uri="{FF2B5EF4-FFF2-40B4-BE49-F238E27FC236}">
+                <a16:creationId xmlns:a16="http://schemas.microsoft.com/office/drawing/2014/main" id="{B5B2745B-F5C6-8FBF-1FAE-FE621EFA88F0}"/>
+              </a:ext>
+            </a:extLst>
+          </p:cNvPr>
+          <p:cNvSpPr txBox="1"/>
+          <p:nvPr/>
+        </p:nvSpPr>
+        <p:spPr>
+          <a:xfrm>
+            <a:off x="2275515" y="2823928"/>
+            <a:ext cx="7640969" cy="1210143"/>
+          </a:xfrm>
+          <a:prstGeom prst="rect">
+            <a:avLst/>
+          </a:prstGeom>
+          <a:noFill/>
+          <a:ln>
+            <a:noFill/>
+          </a:ln>
+        </p:spPr>
+        <p:txBody>
+          <a:bodyPr spcFirstLastPara="1" wrap="square" lIns="91425" tIns="45700" rIns="91425" bIns="45700" anchor="t" anchorCtr="0">
+            <a:noAutofit/>
+          </a:bodyPr>
+          <a:lstStyle/>
+          <a:p>
+            <a:pPr lvl="0" algn="ctr"/>
+            <a:r>
+              <a:rPr lang="en-US" sz="6600" b="1" dirty="0">
+                <a:solidFill>
+                  <a:schemeClr val="lt1"/>
+                </a:solidFill>
+              </a:rPr>
+              <a:t>Questions</a:t>
+            </a:r>
+            <a:r>
+              <a:rPr lang="en-US" sz="5400" b="1" dirty="0">
+                <a:solidFill>
+                  <a:schemeClr val="lt1"/>
+                </a:solidFill>
+              </a:rPr>
+              <a:t>?</a:t>
+            </a:r>
+          </a:p>
+        </p:txBody>
+      </p:sp>
+      <p:pic>
+        <p:nvPicPr>
+          <p:cNvPr id="265" name="Google Shape;265;p37">
+            <a:extLst>
+              <a:ext uri="{FF2B5EF4-FFF2-40B4-BE49-F238E27FC236}">
+                <a16:creationId xmlns:a16="http://schemas.microsoft.com/office/drawing/2014/main" id="{EDC8C897-5AB2-076F-5135-9B30ACCBD22F}"/>
+              </a:ext>
+            </a:extLst>
+          </p:cNvPr>
+          <p:cNvPicPr preferRelativeResize="0"/>
+          <p:nvPr/>
+        </p:nvPicPr>
+        <p:blipFill rotWithShape="1">
+          <a:blip r:embed="rId4">
+            <a:alphaModFix/>
+          </a:blip>
+          <a:srcRect/>
+          <a:stretch/>
+        </p:blipFill>
+        <p:spPr>
+          <a:xfrm>
+            <a:off x="11557509" y="233819"/>
+            <a:ext cx="271308" cy="389810"/>
+          </a:xfrm>
+          <a:prstGeom prst="rect">
+            <a:avLst/>
+          </a:prstGeom>
+          <a:noFill/>
+          <a:ln>
+            <a:noFill/>
+          </a:ln>
+        </p:spPr>
+      </p:pic>
+      <p:sp>
+        <p:nvSpPr>
+          <p:cNvPr id="266" name="Google Shape;266;p37">
+            <a:extLst>
+              <a:ext uri="{FF2B5EF4-FFF2-40B4-BE49-F238E27FC236}">
+                <a16:creationId xmlns:a16="http://schemas.microsoft.com/office/drawing/2014/main" id="{CF8648FC-7240-4BBB-9E09-C030BD1A8052}"/>
+              </a:ext>
+            </a:extLst>
+          </p:cNvPr>
+          <p:cNvSpPr txBox="1"/>
+          <p:nvPr/>
+        </p:nvSpPr>
+        <p:spPr>
+          <a:xfrm>
+            <a:off x="9335597" y="6524381"/>
+            <a:ext cx="2473415" cy="230792"/>
+          </a:xfrm>
+          <a:prstGeom prst="rect">
+            <a:avLst/>
+          </a:prstGeom>
+          <a:noFill/>
+          <a:ln>
+            <a:noFill/>
+          </a:ln>
+        </p:spPr>
+        <p:txBody>
+          <a:bodyPr spcFirstLastPara="1" wrap="square" lIns="91425" tIns="45700" rIns="91425" bIns="45700" anchor="t" anchorCtr="0">
+            <a:spAutoFit/>
+          </a:bodyPr>
+          <a:lstStyle/>
+          <a:p>
+            <a:pPr marL="0" marR="0" lvl="0" indent="0" algn="r" rtl="0">
+              <a:lnSpc>
+                <a:spcPct val="100000"/>
+              </a:lnSpc>
+              <a:spcBef>
+                <a:spcPts val="0"/>
+              </a:spcBef>
+              <a:spcAft>
+                <a:spcPts val="0"/>
+              </a:spcAft>
+              <a:buNone/>
+            </a:pPr>
+            <a:r>
+              <a:rPr lang="en-US" sz="900" b="0" i="0" u="none" strike="noStrike" cap="none">
+                <a:solidFill>
+                  <a:schemeClr val="lt1"/>
+                </a:solidFill>
+                <a:latin typeface="Arial"/>
+                <a:ea typeface="Arial"/>
+                <a:cs typeface="Arial"/>
+                <a:sym typeface="Arial"/>
+              </a:rPr>
+              <a:t>GRAINGER ENGINEERING</a:t>
+            </a:r>
+            <a:endParaRPr/>
+          </a:p>
+        </p:txBody>
+      </p:sp>
+      <p:sp>
+        <p:nvSpPr>
+          <p:cNvPr id="267" name="Google Shape;267;p37">
+            <a:extLst>
+              <a:ext uri="{FF2B5EF4-FFF2-40B4-BE49-F238E27FC236}">
+                <a16:creationId xmlns:a16="http://schemas.microsoft.com/office/drawing/2014/main" id="{6A5B7064-0FC6-E501-D020-2C92B5A6057B}"/>
+              </a:ext>
+            </a:extLst>
+          </p:cNvPr>
+          <p:cNvSpPr txBox="1"/>
+          <p:nvPr/>
+        </p:nvSpPr>
+        <p:spPr>
+          <a:xfrm>
+            <a:off x="376807" y="6524381"/>
+            <a:ext cx="7991337" cy="230792"/>
+          </a:xfrm>
+          <a:prstGeom prst="rect">
+            <a:avLst/>
+          </a:prstGeom>
+          <a:noFill/>
+          <a:ln>
+            <a:noFill/>
+          </a:ln>
+        </p:spPr>
+        <p:txBody>
+          <a:bodyPr spcFirstLastPara="1" wrap="square" lIns="91425" tIns="45700" rIns="91425" bIns="45700" anchor="t" anchorCtr="0">
+            <a:spAutoFit/>
+          </a:bodyPr>
+          <a:lstStyle/>
+          <a:p>
+            <a:pPr marL="0" marR="0" lvl="0" indent="0" algn="l" rtl="0">
+              <a:lnSpc>
+                <a:spcPct val="100000"/>
+              </a:lnSpc>
+              <a:spcBef>
+                <a:spcPts val="0"/>
+              </a:spcBef>
+              <a:spcAft>
+                <a:spcPts val="0"/>
+              </a:spcAft>
+              <a:buNone/>
+            </a:pPr>
+            <a:r>
+              <a:rPr lang="en-US" sz="900" dirty="0">
+                <a:solidFill>
+                  <a:schemeClr val="lt1"/>
+                </a:solidFill>
+              </a:rPr>
+              <a:t>SYSTEMS ENGINEERING </a:t>
+            </a:r>
+            <a:endParaRPr dirty="0"/>
+          </a:p>
+        </p:txBody>
+      </p:sp>
+      <p:grpSp>
+        <p:nvGrpSpPr>
+          <p:cNvPr id="268" name="Google Shape;268;p37">
+            <a:extLst>
+              <a:ext uri="{FF2B5EF4-FFF2-40B4-BE49-F238E27FC236}">
+                <a16:creationId xmlns:a16="http://schemas.microsoft.com/office/drawing/2014/main" id="{69F24B96-E9CD-EB54-C22A-3DD90799A7A7}"/>
+              </a:ext>
+            </a:extLst>
+          </p:cNvPr>
+          <p:cNvGrpSpPr/>
+          <p:nvPr/>
+        </p:nvGrpSpPr>
+        <p:grpSpPr>
+          <a:xfrm>
+            <a:off x="4066674" y="6601537"/>
+            <a:ext cx="5233412" cy="70446"/>
+            <a:chOff x="4033424" y="6601537"/>
+            <a:chExt cx="5233412" cy="70446"/>
+          </a:xfrm>
+        </p:grpSpPr>
+        <p:cxnSp>
+          <p:nvCxnSpPr>
+            <p:cNvPr id="269" name="Google Shape;269;p37">
+              <a:extLst>
+                <a:ext uri="{FF2B5EF4-FFF2-40B4-BE49-F238E27FC236}">
+                  <a16:creationId xmlns:a16="http://schemas.microsoft.com/office/drawing/2014/main" id="{BDF89024-C4A2-8F3A-DA57-A772C1368044}"/>
+                </a:ext>
+              </a:extLst>
+            </p:cNvPr>
+            <p:cNvCxnSpPr/>
+            <p:nvPr/>
+          </p:nvCxnSpPr>
+          <p:spPr>
+            <a:xfrm rot="10800000">
+              <a:off x="4033424" y="6639606"/>
+              <a:ext cx="5164651" cy="0"/>
+            </a:xfrm>
+            <a:prstGeom prst="straightConnector1">
+              <a:avLst/>
+            </a:prstGeom>
+            <a:noFill/>
+            <a:ln w="9525" cap="flat" cmpd="sng">
+              <a:solidFill>
+                <a:schemeClr val="lt1"/>
+              </a:solidFill>
+              <a:prstDash val="solid"/>
+              <a:round/>
+              <a:headEnd type="none" w="sm" len="sm"/>
+              <a:tailEnd type="none" w="sm" len="sm"/>
+            </a:ln>
+          </p:spPr>
+        </p:cxnSp>
+        <p:sp>
+          <p:nvSpPr>
+            <p:cNvPr id="270" name="Google Shape;270;p37">
+              <a:extLst>
+                <a:ext uri="{FF2B5EF4-FFF2-40B4-BE49-F238E27FC236}">
+                  <a16:creationId xmlns:a16="http://schemas.microsoft.com/office/drawing/2014/main" id="{B3758997-614E-F4D9-9F4D-D716DCC856BA}"/>
+                </a:ext>
+              </a:extLst>
+            </p:cNvPr>
+            <p:cNvSpPr/>
+            <p:nvPr/>
+          </p:nvSpPr>
+          <p:spPr>
+            <a:xfrm>
+              <a:off x="9196390" y="6601537"/>
+              <a:ext cx="70446" cy="70446"/>
+            </a:xfrm>
+            <a:prstGeom prst="ellipse">
+              <a:avLst/>
+            </a:prstGeom>
+            <a:solidFill>
+              <a:schemeClr val="lt1"/>
+            </a:solidFill>
+            <a:ln>
+              <a:noFill/>
+            </a:ln>
+          </p:spPr>
+          <p:txBody>
+            <a:bodyPr spcFirstLastPara="1" wrap="square" lIns="91425" tIns="45700" rIns="91425" bIns="45700" anchor="ctr" anchorCtr="0">
+              <a:noAutofit/>
+            </a:bodyPr>
+            <a:lstStyle/>
+            <a:p>
+              <a:pPr marL="0" marR="0" lvl="0" indent="0" algn="ctr" rtl="0">
+                <a:lnSpc>
+                  <a:spcPct val="100000"/>
+                </a:lnSpc>
+                <a:spcBef>
+                  <a:spcPts val="0"/>
+                </a:spcBef>
+                <a:spcAft>
+                  <a:spcPts val="0"/>
+                </a:spcAft>
+                <a:buNone/>
+              </a:pPr>
+              <a:endParaRPr sz="1400" b="0" i="0" u="none" strike="noStrike" cap="none">
+                <a:solidFill>
+                  <a:schemeClr val="lt1"/>
+                </a:solidFill>
+                <a:latin typeface="Arial"/>
+                <a:ea typeface="Arial"/>
+                <a:cs typeface="Arial"/>
+                <a:sym typeface="Arial"/>
+              </a:endParaRPr>
+            </a:p>
+          </p:txBody>
+        </p:sp>
+      </p:grpSp>
+    </p:spTree>
+    <p:extLst>
+      <p:ext uri="{BB962C8B-B14F-4D97-AF65-F5344CB8AC3E}">
+        <p14:creationId xmlns:p14="http://schemas.microsoft.com/office/powerpoint/2010/main" val="2315989789"/>
+      </p:ext>
+    </p:extLst>
+  </p:cSld>
+  <p:clrMapOvr>
+    <a:masterClrMapping/>
+  </p:clrMapOvr>
+</p:sld>
+</file>
+
+<file path=ppt/slides/slide16.xml><?xml version="1.0" encoding="utf-8"?>
 <p:sld xmlns:a="http://schemas.openxmlformats.org/drawingml/2006/main" xmlns:r="http://schemas.openxmlformats.org/officeDocument/2006/relationships" xmlns:p="http://schemas.openxmlformats.org/presentationml/2006/main">
   <p:cSld>
     <p:bg>

</xml_diff>